<commit_message>
UI updates, password hide/show, confirmation on delete
</commit_message>
<xml_diff>
--- a/icon_design_selection.pptx
+++ b/icon_design_selection.pptx
@@ -7,6 +7,8 @@
   <p:sldIdLst>
     <p:sldId id="256" r:id="rId2"/>
     <p:sldId id="258" r:id="rId3"/>
+    <p:sldId id="260" r:id="rId4"/>
+    <p:sldId id="261" r:id="rId5"/>
   </p:sldIdLst>
   <p:sldSz cx="12192000" cy="6858000"/>
   <p:notesSz cx="6858000" cy="9144000"/>
@@ -262,7 +264,7 @@
           <a:p>
             <a:fld id="{7B2F8B46-3405-4A4D-86C1-D1ACDF338CB6}" type="datetimeFigureOut">
               <a:rPr lang="en-US" smtClean="0"/>
-              <a:t>12/9/2018</a:t>
+              <a:t>3/4/2019</a:t>
             </a:fld>
             <a:endParaRPr lang="en-US"/>
           </a:p>
@@ -462,7 +464,7 @@
           <a:p>
             <a:fld id="{7B2F8B46-3405-4A4D-86C1-D1ACDF338CB6}" type="datetimeFigureOut">
               <a:rPr lang="en-US" smtClean="0"/>
-              <a:t>12/9/2018</a:t>
+              <a:t>3/4/2019</a:t>
             </a:fld>
             <a:endParaRPr lang="en-US"/>
           </a:p>
@@ -672,7 +674,7 @@
           <a:p>
             <a:fld id="{7B2F8B46-3405-4A4D-86C1-D1ACDF338CB6}" type="datetimeFigureOut">
               <a:rPr lang="en-US" smtClean="0"/>
-              <a:t>12/9/2018</a:t>
+              <a:t>3/4/2019</a:t>
             </a:fld>
             <a:endParaRPr lang="en-US"/>
           </a:p>
@@ -872,7 +874,7 @@
           <a:p>
             <a:fld id="{7B2F8B46-3405-4A4D-86C1-D1ACDF338CB6}" type="datetimeFigureOut">
               <a:rPr lang="en-US" smtClean="0"/>
-              <a:t>12/9/2018</a:t>
+              <a:t>3/4/2019</a:t>
             </a:fld>
             <a:endParaRPr lang="en-US"/>
           </a:p>
@@ -1148,7 +1150,7 @@
           <a:p>
             <a:fld id="{7B2F8B46-3405-4A4D-86C1-D1ACDF338CB6}" type="datetimeFigureOut">
               <a:rPr lang="en-US" smtClean="0"/>
-              <a:t>12/9/2018</a:t>
+              <a:t>3/4/2019</a:t>
             </a:fld>
             <a:endParaRPr lang="en-US"/>
           </a:p>
@@ -1416,7 +1418,7 @@
           <a:p>
             <a:fld id="{7B2F8B46-3405-4A4D-86C1-D1ACDF338CB6}" type="datetimeFigureOut">
               <a:rPr lang="en-US" smtClean="0"/>
-              <a:t>12/9/2018</a:t>
+              <a:t>3/4/2019</a:t>
             </a:fld>
             <a:endParaRPr lang="en-US"/>
           </a:p>
@@ -1831,7 +1833,7 @@
           <a:p>
             <a:fld id="{7B2F8B46-3405-4A4D-86C1-D1ACDF338CB6}" type="datetimeFigureOut">
               <a:rPr lang="en-US" smtClean="0"/>
-              <a:t>12/9/2018</a:t>
+              <a:t>3/4/2019</a:t>
             </a:fld>
             <a:endParaRPr lang="en-US"/>
           </a:p>
@@ -1973,7 +1975,7 @@
           <a:p>
             <a:fld id="{7B2F8B46-3405-4A4D-86C1-D1ACDF338CB6}" type="datetimeFigureOut">
               <a:rPr lang="en-US" smtClean="0"/>
-              <a:t>12/9/2018</a:t>
+              <a:t>3/4/2019</a:t>
             </a:fld>
             <a:endParaRPr lang="en-US"/>
           </a:p>
@@ -2086,7 +2088,7 @@
           <a:p>
             <a:fld id="{7B2F8B46-3405-4A4D-86C1-D1ACDF338CB6}" type="datetimeFigureOut">
               <a:rPr lang="en-US" smtClean="0"/>
-              <a:t>12/9/2018</a:t>
+              <a:t>3/4/2019</a:t>
             </a:fld>
             <a:endParaRPr lang="en-US"/>
           </a:p>
@@ -2399,7 +2401,7 @@
           <a:p>
             <a:fld id="{7B2F8B46-3405-4A4D-86C1-D1ACDF338CB6}" type="datetimeFigureOut">
               <a:rPr lang="en-US" smtClean="0"/>
-              <a:t>12/9/2018</a:t>
+              <a:t>3/4/2019</a:t>
             </a:fld>
             <a:endParaRPr lang="en-US"/>
           </a:p>
@@ -2688,7 +2690,7 @@
           <a:p>
             <a:fld id="{7B2F8B46-3405-4A4D-86C1-D1ACDF338CB6}" type="datetimeFigureOut">
               <a:rPr lang="en-US" smtClean="0"/>
-              <a:t>12/9/2018</a:t>
+              <a:t>3/4/2019</a:t>
             </a:fld>
             <a:endParaRPr lang="en-US"/>
           </a:p>
@@ -2931,7 +2933,7 @@
           <a:p>
             <a:fld id="{7B2F8B46-3405-4A4D-86C1-D1ACDF338CB6}" type="datetimeFigureOut">
               <a:rPr lang="en-US" smtClean="0"/>
-              <a:t>12/9/2018</a:t>
+              <a:t>3/4/2019</a:t>
             </a:fld>
             <a:endParaRPr lang="en-US"/>
           </a:p>
@@ -3902,6 +3904,244 @@
 </p:sld>
 </file>
 
+<file path=ppt/slides/slide3.xml><?xml version="1.0" encoding="utf-8"?>
+<p:sld xmlns:a="http://schemas.openxmlformats.org/drawingml/2006/main" xmlns:r="http://schemas.openxmlformats.org/officeDocument/2006/relationships" xmlns:p="http://schemas.openxmlformats.org/presentationml/2006/main">
+  <p:cSld>
+    <p:spTree>
+      <p:nvGrpSpPr>
+        <p:cNvPr id="1" name=""/>
+        <p:cNvGrpSpPr/>
+        <p:nvPr/>
+      </p:nvGrpSpPr>
+      <p:grpSpPr>
+        <a:xfrm>
+          <a:off x="0" y="0"/>
+          <a:ext cx="0" cy="0"/>
+          <a:chOff x="0" y="0"/>
+          <a:chExt cx="0" cy="0"/>
+        </a:xfrm>
+      </p:grpSpPr>
+      <p:sp>
+        <p:nvSpPr>
+          <p:cNvPr id="3" name="Untertitel 2">
+            <a:extLst>
+              <a:ext uri="{FF2B5EF4-FFF2-40B4-BE49-F238E27FC236}">
+                <a16:creationId xmlns:a16="http://schemas.microsoft.com/office/drawing/2014/main" id="{562AE0D2-2780-410C-A1F1-F51E524323CE}"/>
+              </a:ext>
+            </a:extLst>
+          </p:cNvPr>
+          <p:cNvSpPr>
+            <a:spLocks noGrp="1"/>
+          </p:cNvSpPr>
+          <p:nvPr>
+            <p:ph type="subTitle" idx="1"/>
+          </p:nvPr>
+        </p:nvSpPr>
+        <p:spPr>
+          <a:xfrm>
+            <a:off x="1299833" y="3398441"/>
+            <a:ext cx="9144000" cy="1655762"/>
+          </a:xfrm>
+        </p:spPr>
+        <p:txBody>
+          <a:bodyPr>
+            <a:normAutofit fontScale="92500"/>
+          </a:bodyPr>
+          <a:lstStyle/>
+          <a:p>
+            <a:r>
+              <a:rPr lang="en-US" dirty="0"/>
+              <a:t>&lt;div&gt;Icons made by &lt;a </a:t>
+            </a:r>
+            <a:r>
+              <a:rPr lang="en-US" dirty="0" err="1"/>
+              <a:t>href</a:t>
+            </a:r>
+            <a:r>
+              <a:rPr lang="en-US" dirty="0"/>
+              <a:t>="https://www.freepik.com/" title="</a:t>
+            </a:r>
+            <a:r>
+              <a:rPr lang="en-US" dirty="0" err="1"/>
+              <a:t>Freepik</a:t>
+            </a:r>
+            <a:r>
+              <a:rPr lang="en-US" dirty="0"/>
+              <a:t>"&gt;</a:t>
+            </a:r>
+            <a:r>
+              <a:rPr lang="en-US" dirty="0" err="1"/>
+              <a:t>Freepik</a:t>
+            </a:r>
+            <a:r>
+              <a:rPr lang="en-US" dirty="0"/>
+              <a:t>&lt;/a&gt; from &lt;a </a:t>
+            </a:r>
+            <a:r>
+              <a:rPr lang="en-US" dirty="0" err="1"/>
+              <a:t>href</a:t>
+            </a:r>
+            <a:r>
+              <a:rPr lang="en-US" dirty="0"/>
+              <a:t>="https://www.flaticon.com/" 			    title="</a:t>
+            </a:r>
+            <a:r>
+              <a:rPr lang="en-US" dirty="0" err="1"/>
+              <a:t>Flaticon</a:t>
+            </a:r>
+            <a:r>
+              <a:rPr lang="en-US" dirty="0"/>
+              <a:t>"&gt;www.flaticon.com&lt;/a&gt; is licensed by &lt;a </a:t>
+            </a:r>
+            <a:r>
+              <a:rPr lang="en-US" dirty="0" err="1"/>
+              <a:t>href</a:t>
+            </a:r>
+            <a:r>
+              <a:rPr lang="en-US" dirty="0"/>
+              <a:t>="http://creativecommons.org/licenses/by/3.0/" 			    title="Creative Commons BY 3.0" target="_blank"&gt;CC 3.0 BY&lt;/a&gt;&lt;/div&gt;</a:t>
+            </a:r>
+          </a:p>
+        </p:txBody>
+      </p:sp>
+      <p:pic>
+        <p:nvPicPr>
+          <p:cNvPr id="5" name="Grafik 4">
+            <a:extLst>
+              <a:ext uri="{FF2B5EF4-FFF2-40B4-BE49-F238E27FC236}">
+                <a16:creationId xmlns:a16="http://schemas.microsoft.com/office/drawing/2014/main" id="{322C20A9-DBA5-4B27-A169-DE05936DA8CC}"/>
+              </a:ext>
+            </a:extLst>
+          </p:cNvPr>
+          <p:cNvPicPr>
+            <a:picLocks noChangeAspect="1"/>
+          </p:cNvPicPr>
+          <p:nvPr/>
+        </p:nvPicPr>
+        <p:blipFill>
+          <a:blip r:embed="rId2">
+            <a:extLst>
+              <a:ext uri="{28A0092B-C50C-407E-A947-70E740481C1C}">
+                <a14:useLocalDpi xmlns:a14="http://schemas.microsoft.com/office/drawing/2010/main" val="0"/>
+              </a:ext>
+              <a:ext uri="{96DAC541-7B7A-43D3-8B79-37D633B846F1}">
+                <asvg:svgBlip xmlns:asvg="http://schemas.microsoft.com/office/drawing/2016/SVG/main" r:embed="rId3"/>
+              </a:ext>
+            </a:extLst>
+          </a:blip>
+          <a:stretch>
+            <a:fillRect/>
+          </a:stretch>
+        </p:blipFill>
+        <p:spPr>
+          <a:xfrm>
+            <a:off x="5220938" y="2175271"/>
+            <a:ext cx="623887" cy="623887"/>
+          </a:xfrm>
+          <a:prstGeom prst="rect">
+            <a:avLst/>
+          </a:prstGeom>
+        </p:spPr>
+      </p:pic>
+    </p:spTree>
+    <p:extLst>
+      <p:ext uri="{BB962C8B-B14F-4D97-AF65-F5344CB8AC3E}">
+        <p14:creationId xmlns:p14="http://schemas.microsoft.com/office/powerpoint/2010/main" val="822170375"/>
+      </p:ext>
+    </p:extLst>
+  </p:cSld>
+  <p:clrMapOvr>
+    <a:masterClrMapping/>
+  </p:clrMapOvr>
+</p:sld>
+</file>
+
+<file path=ppt/slides/slide4.xml><?xml version="1.0" encoding="utf-8"?>
+<p:sld xmlns:a="http://schemas.openxmlformats.org/drawingml/2006/main" xmlns:r="http://schemas.openxmlformats.org/officeDocument/2006/relationships" xmlns:p="http://schemas.openxmlformats.org/presentationml/2006/main">
+  <p:cSld>
+    <p:spTree>
+      <p:nvGrpSpPr>
+        <p:cNvPr id="1" name=""/>
+        <p:cNvGrpSpPr/>
+        <p:nvPr/>
+      </p:nvGrpSpPr>
+      <p:grpSpPr>
+        <a:xfrm>
+          <a:off x="0" y="0"/>
+          <a:ext cx="0" cy="0"/>
+          <a:chOff x="0" y="0"/>
+          <a:chExt cx="0" cy="0"/>
+        </a:xfrm>
+      </p:grpSpPr>
+      <p:sp>
+        <p:nvSpPr>
+          <p:cNvPr id="2" name="Titel 1">
+            <a:extLst>
+              <a:ext uri="{FF2B5EF4-FFF2-40B4-BE49-F238E27FC236}">
+                <a16:creationId xmlns:a16="http://schemas.microsoft.com/office/drawing/2014/main" id="{A73433C5-4435-4EDA-A993-D9FDED5312CF}"/>
+              </a:ext>
+            </a:extLst>
+          </p:cNvPr>
+          <p:cNvSpPr>
+            <a:spLocks noGrp="1"/>
+          </p:cNvSpPr>
+          <p:nvPr>
+            <p:ph type="title"/>
+          </p:nvPr>
+        </p:nvSpPr>
+        <p:spPr/>
+        <p:txBody>
+          <a:bodyPr/>
+          <a:lstStyle/>
+          <a:p>
+            <a:r>
+              <a:rPr lang="en-US"/>
+              <a:t>Space</a:t>
+            </a:r>
+          </a:p>
+        </p:txBody>
+      </p:sp>
+      <p:sp>
+        <p:nvSpPr>
+          <p:cNvPr id="3" name="Inhaltsplatzhalter 2">
+            <a:extLst>
+              <a:ext uri="{FF2B5EF4-FFF2-40B4-BE49-F238E27FC236}">
+                <a16:creationId xmlns:a16="http://schemas.microsoft.com/office/drawing/2014/main" id="{F7ECEBD5-61FA-4160-B1EC-9F346A29FA9C}"/>
+              </a:ext>
+            </a:extLst>
+          </p:cNvPr>
+          <p:cNvSpPr>
+            <a:spLocks noGrp="1"/>
+          </p:cNvSpPr>
+          <p:nvPr>
+            <p:ph idx="1"/>
+          </p:nvPr>
+        </p:nvSpPr>
+        <p:spPr/>
+        <p:txBody>
+          <a:bodyPr/>
+          <a:lstStyle/>
+          <a:p>
+            <a:r>
+              <a:rPr lang="en-US" dirty="0"/>
+              <a:t>https://www.flaticon.com/packs/space-elements</a:t>
+            </a:r>
+          </a:p>
+        </p:txBody>
+      </p:sp>
+    </p:spTree>
+    <p:extLst>
+      <p:ext uri="{BB962C8B-B14F-4D97-AF65-F5344CB8AC3E}">
+        <p14:creationId xmlns:p14="http://schemas.microsoft.com/office/powerpoint/2010/main" val="528538586"/>
+      </p:ext>
+    </p:extLst>
+  </p:cSld>
+  <p:clrMapOvr>
+    <a:masterClrMapping/>
+  </p:clrMapOvr>
+</p:sld>
+</file>
+
 <file path=ppt/theme/theme1.xml><?xml version="1.0" encoding="utf-8"?>
 <a:theme xmlns:a="http://schemas.openxmlformats.org/drawingml/2006/main" name="Office">
   <a:themeElements>

</xml_diff>